<commit_message>
Iniciação da formatação na ABNT
</commit_message>
<xml_diff>
--- a/Apresentação.pptx
+++ b/Apresentação.pptx
@@ -8,6 +8,7 @@
     <p:sldId id="256" r:id="rId2"/>
     <p:sldId id="257" r:id="rId3"/>
     <p:sldId id="258" r:id="rId4"/>
+    <p:sldId id="259" r:id="rId5"/>
   </p:sldIdLst>
   <p:sldSz cx="12192000" cy="6858000"/>
   <p:notesSz cx="6858000" cy="9144000"/>
@@ -106,6 +107,11 @@
       </a:defRPr>
     </a:lvl9pPr>
   </p:defaultTextStyle>
+  <p:extLst>
+    <p:ext uri="{EFAFB233-063F-42B5-8137-9DF3F51BA10A}">
+      <p15:sldGuideLst xmlns:p15="http://schemas.microsoft.com/office/powerpoint/2012/main"/>
+    </p:ext>
+  </p:extLst>
 </p:presentation>
 </file>
 
@@ -734,7 +740,7 @@
           <a:p>
             <a:fld id="{BD90B61F-930A-2248-84EC-669398F343B2}" type="datetimeFigureOut">
               <a:rPr lang="pt-BR" smtClean="0"/>
-              <a:t>08/05/17</a:t>
+              <a:t>15/05/17</a:t>
             </a:fld>
             <a:endParaRPr lang="pt-BR"/>
           </a:p>
@@ -940,7 +946,7 @@
           <a:p>
             <a:fld id="{BD90B61F-930A-2248-84EC-669398F343B2}" type="datetimeFigureOut">
               <a:rPr lang="pt-BR" smtClean="0"/>
-              <a:t>08/05/17</a:t>
+              <a:t>15/05/17</a:t>
             </a:fld>
             <a:endParaRPr lang="pt-BR"/>
           </a:p>
@@ -1130,7 +1136,7 @@
           <a:p>
             <a:fld id="{BD90B61F-930A-2248-84EC-669398F343B2}" type="datetimeFigureOut">
               <a:rPr lang="pt-BR" smtClean="0"/>
-              <a:t>08/05/17</a:t>
+              <a:t>15/05/17</a:t>
             </a:fld>
             <a:endParaRPr lang="pt-BR"/>
           </a:p>
@@ -1290,7 +1296,7 @@
           <a:p>
             <a:fld id="{BD90B61F-930A-2248-84EC-669398F343B2}" type="datetimeFigureOut">
               <a:rPr lang="pt-BR" smtClean="0"/>
-              <a:t>08/05/17</a:t>
+              <a:t>15/05/17</a:t>
             </a:fld>
             <a:endParaRPr lang="pt-BR"/>
           </a:p>
@@ -1545,7 +1551,7 @@
           <a:p>
             <a:fld id="{BD90B61F-930A-2248-84EC-669398F343B2}" type="datetimeFigureOut">
               <a:rPr lang="pt-BR" smtClean="0"/>
-              <a:t>08/05/17</a:t>
+              <a:t>15/05/17</a:t>
             </a:fld>
             <a:endParaRPr lang="pt-BR"/>
           </a:p>
@@ -1959,7 +1965,7 @@
           <a:p>
             <a:fld id="{BD90B61F-930A-2248-84EC-669398F343B2}" type="datetimeFigureOut">
               <a:rPr lang="pt-BR" smtClean="0"/>
-              <a:t>08/05/17</a:t>
+              <a:t>15/05/17</a:t>
             </a:fld>
             <a:endParaRPr lang="pt-BR"/>
           </a:p>
@@ -2405,7 +2411,7 @@
           <a:p>
             <a:fld id="{BD90B61F-930A-2248-84EC-669398F343B2}" type="datetimeFigureOut">
               <a:rPr lang="pt-BR" smtClean="0"/>
-              <a:t>08/05/17</a:t>
+              <a:t>15/05/17</a:t>
             </a:fld>
             <a:endParaRPr lang="pt-BR"/>
           </a:p>
@@ -2506,7 +2512,7 @@
           <a:p>
             <a:fld id="{BD90B61F-930A-2248-84EC-669398F343B2}" type="datetimeFigureOut">
               <a:rPr lang="pt-BR" smtClean="0"/>
-              <a:t>08/05/17</a:t>
+              <a:t>15/05/17</a:t>
             </a:fld>
             <a:endParaRPr lang="pt-BR"/>
           </a:p>
@@ -2632,7 +2638,7 @@
           <a:p>
             <a:fld id="{BD90B61F-930A-2248-84EC-669398F343B2}" type="datetimeFigureOut">
               <a:rPr lang="pt-BR" smtClean="0"/>
-              <a:t>08/05/17</a:t>
+              <a:t>15/05/17</a:t>
             </a:fld>
             <a:endParaRPr lang="pt-BR"/>
           </a:p>
@@ -2906,7 +2912,7 @@
           <a:p>
             <a:fld id="{BD90B61F-930A-2248-84EC-669398F343B2}" type="datetimeFigureOut">
               <a:rPr lang="pt-BR" smtClean="0"/>
-              <a:t>08/05/17</a:t>
+              <a:t>15/05/17</a:t>
             </a:fld>
             <a:endParaRPr lang="pt-BR"/>
           </a:p>
@@ -3111,7 +3117,7 @@
           <a:p>
             <a:fld id="{BD90B61F-930A-2248-84EC-669398F343B2}" type="datetimeFigureOut">
               <a:rPr lang="pt-BR" smtClean="0"/>
-              <a:t>08/05/17</a:t>
+              <a:t>15/05/17</a:t>
             </a:fld>
             <a:endParaRPr lang="pt-BR"/>
           </a:p>
@@ -4225,7 +4231,7 @@
           <a:p>
             <a:fld id="{BD90B61F-930A-2248-84EC-669398F343B2}" type="datetimeFigureOut">
               <a:rPr lang="pt-BR" smtClean="0"/>
-              <a:t>08/05/17</a:t>
+              <a:t>15/05/17</a:t>
             </a:fld>
             <a:endParaRPr lang="pt-BR"/>
           </a:p>
@@ -4656,8 +4662,8 @@
         </p:blipFill>
         <p:spPr bwMode="auto">
           <a:xfrm>
-            <a:off x="5473003" y="409904"/>
-            <a:ext cx="1346518" cy="1289667"/>
+            <a:off x="473915" y="193209"/>
+            <a:ext cx="1013522" cy="1033134"/>
           </a:xfrm>
           <a:prstGeom prst="rect">
             <a:avLst/>
@@ -4678,7 +4684,7 @@
         </p:blipFill>
         <p:spPr bwMode="auto">
           <a:xfrm>
-            <a:off x="5371960" y="1699571"/>
+            <a:off x="190360" y="1132435"/>
             <a:ext cx="1580633" cy="729038"/>
           </a:xfrm>
           <a:prstGeom prst="rect">
@@ -4698,8 +4704,8 @@
         </p:nvSpPr>
         <p:spPr>
           <a:xfrm>
-            <a:off x="914140" y="2803395"/>
-            <a:ext cx="10363200" cy="1829761"/>
+            <a:off x="1133076" y="2283189"/>
+            <a:ext cx="10363200" cy="635130"/>
           </a:xfrm>
         </p:spPr>
         <p:txBody>
@@ -4710,22 +4716,22 @@
           <a:p>
             <a:pPr algn="ctr"/>
             <a:r>
-              <a:rPr lang="pt-BR" sz="3200" dirty="0" smtClean="0">
+              <a:rPr lang="en-US" sz="2800" dirty="0" smtClean="0">
                 <a:solidFill>
                   <a:schemeClr val="tx1"/>
                 </a:solidFill>
               </a:rPr>
-              <a:t>ESTRAT</a:t>
-            </a:r>
-            <a:r>
-              <a:rPr lang="en-US" sz="3200" dirty="0" smtClean="0">
+              <a:t>TRABALHO DE CONCLUS</a:t>
+            </a:r>
+            <a:r>
+              <a:rPr lang="en-US" sz="2800" dirty="0" smtClean="0">
                 <a:solidFill>
                   <a:schemeClr val="tx1"/>
                 </a:solidFill>
               </a:rPr>
-              <a:t>ÉGIA DE SOFTWARE NA TECNOLOGIA JAVA: AUTOMAÇÃO DE TRANSAÇÕES EM SGBD’S RELACIONAIS</a:t>
-            </a:r>
-            <a:endParaRPr lang="pt-BR" sz="3200" dirty="0">
+              <a:t>ÃO DE CURSO</a:t>
+            </a:r>
+            <a:endParaRPr lang="pt-BR" sz="2800" dirty="0">
               <a:solidFill>
                 <a:schemeClr val="tx1"/>
               </a:solidFill>
@@ -4823,6 +4829,226 @@
             <a:endParaRPr lang="pt-BR" dirty="0">
               <a:solidFill>
                 <a:schemeClr val="tx1"/>
+              </a:solidFill>
+            </a:endParaRPr>
+          </a:p>
+        </p:txBody>
+      </p:sp>
+      <p:sp>
+        <p:nvSpPr>
+          <p:cNvPr id="6" name="Título 1"/>
+          <p:cNvSpPr txBox="1">
+            <a:spLocks/>
+          </p:cNvSpPr>
+          <p:nvPr/>
+        </p:nvSpPr>
+        <p:spPr>
+          <a:xfrm>
+            <a:off x="1770992" y="501795"/>
+            <a:ext cx="10363200" cy="1241280"/>
+          </a:xfrm>
+          <a:prstGeom prst="rect">
+            <a:avLst/>
+          </a:prstGeom>
+        </p:spPr>
+        <p:txBody>
+          <a:bodyPr vert="horz" anchor="b">
+            <a:normAutofit/>
+            <a:scene3d>
+              <a:camera prst="orthographicFront"/>
+              <a:lightRig rig="soft" dir="t"/>
+            </a:scene3d>
+            <a:sp3d prstMaterial="softEdge">
+              <a:bevelT w="25400" h="25400"/>
+            </a:sp3d>
+          </a:bodyPr>
+          <a:lstStyle>
+            <a:lvl1pPr algn="r" rtl="0" eaLnBrk="1" latinLnBrk="0" hangingPunct="1">
+              <a:spcBef>
+                <a:spcPct val="0"/>
+              </a:spcBef>
+              <a:buNone/>
+              <a:defRPr kumimoji="0" sz="4800" b="1" kern="1200">
+                <a:solidFill>
+                  <a:schemeClr val="tx2"/>
+                </a:solidFill>
+                <a:effectLst>
+                  <a:outerShdw blurRad="31750" dist="25400" dir="5400000" algn="tl" rotWithShape="0">
+                    <a:srgbClr val="000000">
+                      <a:alpha val="25000"/>
+                    </a:srgbClr>
+                  </a:outerShdw>
+                </a:effectLst>
+                <a:latin typeface="+mj-lt"/>
+                <a:ea typeface="+mj-ea"/>
+                <a:cs typeface="+mj-cs"/>
+              </a:defRPr>
+            </a:lvl1pPr>
+            <a:extLst/>
+          </a:lstStyle>
+          <a:p>
+            <a:pPr algn="ctr"/>
+            <a:r>
+              <a:rPr lang="en-US" sz="3200" dirty="0" smtClean="0">
+                <a:solidFill>
+                  <a:schemeClr val="tx1"/>
+                </a:solidFill>
+              </a:rPr>
+              <a:t>Centro </a:t>
+            </a:r>
+            <a:r>
+              <a:rPr lang="en-US" sz="3200" dirty="0" err="1" smtClean="0">
+                <a:solidFill>
+                  <a:schemeClr val="tx1"/>
+                </a:solidFill>
+              </a:rPr>
+              <a:t>Universit</a:t>
+            </a:r>
+            <a:r>
+              <a:rPr lang="en-US" sz="3200" dirty="0" err="1" smtClean="0">
+                <a:solidFill>
+                  <a:schemeClr val="tx1"/>
+                </a:solidFill>
+              </a:rPr>
+              <a:t>ário</a:t>
+            </a:r>
+            <a:r>
+              <a:rPr lang="en-US" sz="3200" dirty="0" smtClean="0">
+                <a:solidFill>
+                  <a:schemeClr val="tx1"/>
+                </a:solidFill>
+              </a:rPr>
+              <a:t> </a:t>
+            </a:r>
+            <a:r>
+              <a:rPr lang="en-US" sz="3200" dirty="0" err="1">
+                <a:solidFill>
+                  <a:schemeClr val="tx1"/>
+                </a:solidFill>
+              </a:rPr>
+              <a:t>E</a:t>
+            </a:r>
+            <a:r>
+              <a:rPr lang="en-US" sz="3200" dirty="0" err="1" smtClean="0">
+                <a:solidFill>
+                  <a:schemeClr val="tx1"/>
+                </a:solidFill>
+              </a:rPr>
+              <a:t>stácio</a:t>
+            </a:r>
+            <a:r>
+              <a:rPr lang="en-US" sz="3200" dirty="0" smtClean="0">
+                <a:solidFill>
+                  <a:schemeClr val="tx1"/>
+                </a:solidFill>
+              </a:rPr>
+              <a:t> do </a:t>
+            </a:r>
+            <a:r>
+              <a:rPr lang="en-US" sz="3200" dirty="0" err="1" smtClean="0">
+                <a:solidFill>
+                  <a:schemeClr val="tx1"/>
+                </a:solidFill>
+              </a:rPr>
+              <a:t>Ceará</a:t>
+            </a:r>
+            <a:endParaRPr lang="en-US" sz="3200" dirty="0" smtClean="0">
+              <a:solidFill>
+                <a:schemeClr val="tx1"/>
+              </a:solidFill>
+            </a:endParaRPr>
+          </a:p>
+          <a:p>
+            <a:pPr algn="ctr"/>
+            <a:r>
+              <a:rPr lang="en-US" sz="3200" dirty="0" smtClean="0">
+                <a:solidFill>
+                  <a:schemeClr val="tx1"/>
+                </a:solidFill>
+              </a:rPr>
+              <a:t>BACHARELADO EM SISTEMAS DE INFORMAÇÃO</a:t>
+            </a:r>
+            <a:endParaRPr lang="pt-BR" sz="3200" dirty="0">
+              <a:solidFill>
+                <a:schemeClr val="tx1"/>
+              </a:solidFill>
+            </a:endParaRPr>
+          </a:p>
+        </p:txBody>
+      </p:sp>
+      <p:sp>
+        <p:nvSpPr>
+          <p:cNvPr id="7" name="Título 1"/>
+          <p:cNvSpPr txBox="1">
+            <a:spLocks/>
+          </p:cNvSpPr>
+          <p:nvPr/>
+        </p:nvSpPr>
+        <p:spPr>
+          <a:xfrm>
+            <a:off x="1133076" y="3541581"/>
+            <a:ext cx="10363200" cy="1088951"/>
+          </a:xfrm>
+          <a:prstGeom prst="rect">
+            <a:avLst/>
+          </a:prstGeom>
+        </p:spPr>
+        <p:txBody>
+          <a:bodyPr vert="horz" anchor="b">
+            <a:normAutofit/>
+            <a:scene3d>
+              <a:camera prst="orthographicFront"/>
+              <a:lightRig rig="soft" dir="t"/>
+            </a:scene3d>
+            <a:sp3d prstMaterial="softEdge">
+              <a:bevelT w="25400" h="25400"/>
+            </a:sp3d>
+          </a:bodyPr>
+          <a:lstStyle>
+            <a:lvl1pPr algn="r" rtl="0" eaLnBrk="1" latinLnBrk="0" hangingPunct="1">
+              <a:spcBef>
+                <a:spcPct val="0"/>
+              </a:spcBef>
+              <a:buNone/>
+              <a:defRPr kumimoji="0" sz="4800" b="1" kern="1200">
+                <a:solidFill>
+                  <a:schemeClr val="tx2"/>
+                </a:solidFill>
+                <a:effectLst>
+                  <a:outerShdw blurRad="31750" dist="25400" dir="5400000" algn="tl" rotWithShape="0">
+                    <a:srgbClr val="000000">
+                      <a:alpha val="25000"/>
+                    </a:srgbClr>
+                  </a:outerShdw>
+                </a:effectLst>
+                <a:latin typeface="+mj-lt"/>
+                <a:ea typeface="+mj-ea"/>
+                <a:cs typeface="+mj-cs"/>
+              </a:defRPr>
+            </a:lvl1pPr>
+            <a:extLst/>
+          </a:lstStyle>
+          <a:p>
+            <a:pPr algn="ctr"/>
+            <a:r>
+              <a:rPr lang="pt-BR" sz="2800" dirty="0" smtClean="0">
+                <a:solidFill>
+                  <a:srgbClr val="FF0000"/>
+                </a:solidFill>
+              </a:rPr>
+              <a:t>ESTRAT</a:t>
+            </a:r>
+            <a:r>
+              <a:rPr lang="en-US" sz="2800" dirty="0" smtClean="0">
+                <a:solidFill>
+                  <a:srgbClr val="FF0000"/>
+                </a:solidFill>
+              </a:rPr>
+              <a:t>ÉGIA DE SOFTWARE NA TECNOLOGIA JAVA: AUTOMAÇÃO DE TRANSAÇÕES EM SGBD’S RELACIONAIS</a:t>
+            </a:r>
+            <a:endParaRPr lang="pt-BR" sz="2800" dirty="0">
+              <a:solidFill>
+                <a:srgbClr val="FF0000"/>
               </a:solidFill>
             </a:endParaRPr>
           </a:p>
@@ -5212,8 +5438,8 @@
         </p:blipFill>
         <p:spPr>
           <a:xfrm>
-            <a:off x="10553816" y="4791579"/>
-            <a:ext cx="1563179" cy="2066421"/>
+            <a:off x="9915526" y="4157663"/>
+            <a:ext cx="2201470" cy="2700337"/>
           </a:xfrm>
           <a:prstGeom prst="rect">
             <a:avLst/>
@@ -5344,16 +5570,140 @@
           </a:p>
         </p:txBody>
       </p:sp>
-      <p:sp>
-        <p:nvSpPr>
-          <p:cNvPr id="4" name="CaixaDeTexto 3"/>
+    </p:spTree>
+    <p:extLst>
+      <p:ext uri="{BB962C8B-B14F-4D97-AF65-F5344CB8AC3E}">
+        <p14:creationId xmlns:p14="http://schemas.microsoft.com/office/powerpoint/2010/main" val="930346935"/>
+      </p:ext>
+    </p:extLst>
+  </p:cSld>
+  <p:clrMapOvr>
+    <a:masterClrMapping/>
+  </p:clrMapOvr>
+  <p:timing>
+    <p:tnLst>
+      <p:par>
+        <p:cTn id="1" dur="indefinite" restart="never" nodeType="tmRoot"/>
+      </p:par>
+    </p:tnLst>
+  </p:timing>
+</p:sld>
+</file>
+
+<file path=ppt/slides/slide4.xml><?xml version="1.0" encoding="utf-8"?>
+<p:sld xmlns:a="http://schemas.openxmlformats.org/drawingml/2006/main" xmlns:r="http://schemas.openxmlformats.org/officeDocument/2006/relationships" xmlns:p="http://schemas.openxmlformats.org/presentationml/2006/main">
+  <p:cSld>
+    <p:spTree>
+      <p:nvGrpSpPr>
+        <p:cNvPr id="1" name=""/>
+        <p:cNvGrpSpPr/>
+        <p:nvPr/>
+      </p:nvGrpSpPr>
+      <p:grpSpPr>
+        <a:xfrm>
+          <a:off x="0" y="0"/>
+          <a:ext cx="0" cy="0"/>
+          <a:chOff x="0" y="0"/>
+          <a:chExt cx="0" cy="0"/>
+        </a:xfrm>
+      </p:grpSpPr>
+      <p:pic>
+        <p:nvPicPr>
+          <p:cNvPr id="5" name="Imagem 4"/>
+          <p:cNvPicPr/>
+          <p:nvPr/>
+        </p:nvPicPr>
+        <p:blipFill>
+          <a:blip r:embed="rId2"/>
+          <a:stretch>
+            <a:fillRect/>
+          </a:stretch>
+        </p:blipFill>
+        <p:spPr bwMode="auto">
+          <a:xfrm>
+            <a:off x="10975170" y="0"/>
+            <a:ext cx="1038155" cy="944084"/>
+          </a:xfrm>
+          <a:prstGeom prst="rect">
+            <a:avLst/>
+          </a:prstGeom>
+        </p:spPr>
+      </p:pic>
+      <p:pic>
+        <p:nvPicPr>
+          <p:cNvPr id="6" name="Imagem 5"/>
+          <p:cNvPicPr/>
+          <p:nvPr/>
+        </p:nvPicPr>
+        <p:blipFill>
+          <a:blip r:embed="rId3"/>
+          <a:stretch>
+            <a:fillRect/>
+          </a:stretch>
+        </p:blipFill>
+        <p:spPr bwMode="auto">
+          <a:xfrm>
+            <a:off x="10975170" y="846138"/>
+            <a:ext cx="1038155" cy="568817"/>
+          </a:xfrm>
+          <a:prstGeom prst="rect">
+            <a:avLst/>
+          </a:prstGeom>
+        </p:spPr>
+      </p:pic>
+      <p:sp>
+        <p:nvSpPr>
+          <p:cNvPr id="2" name="Título 1"/>
+          <p:cNvSpPr>
+            <a:spLocks noGrp="1"/>
+          </p:cNvSpPr>
+          <p:nvPr>
+            <p:ph type="title"/>
+          </p:nvPr>
+        </p:nvSpPr>
+        <p:spPr>
+          <a:xfrm>
+            <a:off x="609600" y="274638"/>
+            <a:ext cx="9964981" cy="1143000"/>
+          </a:xfrm>
+        </p:spPr>
+        <p:txBody>
+          <a:bodyPr>
+            <a:normAutofit/>
+          </a:bodyPr>
+          <a:lstStyle/>
+          <a:p>
+            <a:pPr algn="ctr"/>
+            <a:r>
+              <a:rPr lang="pt-BR" sz="2400" dirty="0">
+                <a:solidFill>
+                  <a:schemeClr val="tx1"/>
+                </a:solidFill>
+              </a:rPr>
+              <a:t>ESTRAT</a:t>
+            </a:r>
+            <a:r>
+              <a:rPr lang="en-US" sz="2400" dirty="0">
+                <a:solidFill>
+                  <a:schemeClr val="tx1"/>
+                </a:solidFill>
+              </a:rPr>
+              <a:t>ÉGIA DE SOFTWARE NA TECNOLOGIA JAVA: AUTOMAÇÃO DE TRANSAÇÕES EM SGBD’S RELACIONAIS</a:t>
+            </a:r>
+            <a:endParaRPr lang="pt-BR" sz="2400" dirty="0"/>
+          </a:p>
+        </p:txBody>
+      </p:sp>
+      <p:sp>
+        <p:nvSpPr>
+          <p:cNvPr id="3" name="CaixaDeTexto 2"/>
           <p:cNvSpPr txBox="1"/>
           <p:nvPr/>
         </p:nvSpPr>
         <p:spPr>
-          <a:xfrm rot="10800000" flipV="1">
-            <a:off x="609599" y="3464222"/>
-            <a:ext cx="10725807" cy="1015663"/>
+          <a:xfrm>
+            <a:off x="609600" y="1571624"/>
+            <a:ext cx="10934700" cy="4431983"/>
           </a:xfrm>
           <a:prstGeom prst="rect">
             <a:avLst/>
@@ -5366,78 +5716,732 @@
           </a:bodyPr>
           <a:lstStyle/>
           <a:p>
-            <a:pPr marL="457200" indent="-457200">
-              <a:buFont typeface="+mj-lt"/>
-              <a:buAutoNum type="arabicPeriod"/>
+            <a:pPr marL="285750" indent="-285750">
+              <a:buFont typeface="Wingdings" charset="2"/>
+              <a:buChar char="Ø"/>
             </a:pPr>
             <a:r>
-              <a:rPr lang="pt-BR" sz="3000" b="1" dirty="0" err="1" smtClean="0"/>
-              <a:t>Problem</a:t>
-            </a:r>
-            <a:r>
-              <a:rPr lang="en-US" sz="3000" b="1" dirty="0" err="1" smtClean="0"/>
-              <a:t>ática</a:t>
-            </a:r>
-            <a:r>
-              <a:rPr lang="en-US" sz="3000" b="1" dirty="0" smtClean="0"/>
-              <a:t>: </a:t>
-            </a:r>
-            <a:r>
-              <a:rPr lang="en-US" sz="3000" b="1" dirty="0" err="1" smtClean="0"/>
-              <a:t>Qual</a:t>
-            </a:r>
-            <a:r>
-              <a:rPr lang="en-US" sz="3000" b="1" dirty="0" smtClean="0"/>
-              <a:t> a principal </a:t>
-            </a:r>
-            <a:r>
-              <a:rPr lang="en-US" sz="3000" b="1" dirty="0" err="1" smtClean="0"/>
-              <a:t>questão</a:t>
-            </a:r>
-            <a:r>
-              <a:rPr lang="en-US" sz="3000" b="1" dirty="0" smtClean="0"/>
-              <a:t> do TCC ?</a:t>
-            </a:r>
-          </a:p>
-          <a:p>
-            <a:endParaRPr lang="pt-BR" sz="3000" dirty="0"/>
-          </a:p>
-        </p:txBody>
-      </p:sp>
-      <p:pic>
-        <p:nvPicPr>
-          <p:cNvPr id="7" name="Imagem 6"/>
-          <p:cNvPicPr>
-            <a:picLocks noChangeAspect="1"/>
-          </p:cNvPicPr>
-          <p:nvPr/>
-        </p:nvPicPr>
-        <p:blipFill>
-          <a:blip r:embed="rId4">
-            <a:extLst>
-              <a:ext uri="{28A0092B-C50C-407E-A947-70E740481C1C}">
-                <a14:useLocalDpi xmlns:a14="http://schemas.microsoft.com/office/drawing/2010/main" val="0"/>
-              </a:ext>
-            </a:extLst>
-          </a:blip>
-          <a:stretch>
-            <a:fillRect/>
-          </a:stretch>
-        </p:blipFill>
-        <p:spPr>
-          <a:xfrm>
-            <a:off x="10553816" y="4791579"/>
-            <a:ext cx="1563179" cy="2066421"/>
-          </a:xfrm>
-          <a:prstGeom prst="rect">
-            <a:avLst/>
-          </a:prstGeom>
-        </p:spPr>
-      </p:pic>
+              <a:rPr lang="en-US" sz="2400" dirty="0" err="1" smtClean="0"/>
+              <a:t>Resumo</a:t>
+            </a:r>
+            <a:endParaRPr lang="en-US" sz="2400" dirty="0" smtClean="0"/>
+          </a:p>
+          <a:p>
+            <a:endParaRPr lang="en-US" sz="2400" dirty="0"/>
+          </a:p>
+          <a:p>
+            <a:r>
+              <a:rPr lang="en-US" dirty="0" smtClean="0"/>
+              <a:t>	Uma das </a:t>
+            </a:r>
+            <a:r>
+              <a:rPr lang="en-US" dirty="0" err="1" smtClean="0"/>
+              <a:t>etapas</a:t>
+            </a:r>
+            <a:r>
+              <a:rPr lang="en-US" dirty="0" smtClean="0"/>
+              <a:t> do </a:t>
+            </a:r>
+            <a:r>
+              <a:rPr lang="en-US" dirty="0" err="1" smtClean="0"/>
+              <a:t>trabalho</a:t>
+            </a:r>
+            <a:r>
+              <a:rPr lang="en-US" dirty="0" smtClean="0"/>
+              <a:t> de </a:t>
+            </a:r>
+            <a:r>
+              <a:rPr lang="en-US" dirty="0" err="1" smtClean="0"/>
+              <a:t>desenvolvimento</a:t>
+            </a:r>
+            <a:r>
+              <a:rPr lang="en-US" dirty="0" smtClean="0"/>
+              <a:t> de </a:t>
+            </a:r>
+            <a:r>
+              <a:rPr lang="en-US" dirty="0" err="1" smtClean="0"/>
+              <a:t>todo</a:t>
+            </a:r>
+            <a:r>
+              <a:rPr lang="en-US" dirty="0" smtClean="0"/>
+              <a:t> software </a:t>
+            </a:r>
+            <a:r>
+              <a:rPr lang="en-US" dirty="0" err="1" smtClean="0"/>
+              <a:t>é</a:t>
+            </a:r>
+            <a:r>
+              <a:rPr lang="en-US" dirty="0" smtClean="0"/>
+              <a:t> a </a:t>
+            </a:r>
+            <a:r>
+              <a:rPr lang="en-US" dirty="0" err="1" smtClean="0"/>
+              <a:t>montagem</a:t>
+            </a:r>
+            <a:r>
+              <a:rPr lang="en-US" dirty="0" smtClean="0"/>
+              <a:t> das </a:t>
+            </a:r>
+            <a:r>
+              <a:rPr lang="en-US" dirty="0" err="1" smtClean="0"/>
+              <a:t>estruturas</a:t>
+            </a:r>
+            <a:r>
+              <a:rPr lang="en-US" dirty="0" smtClean="0"/>
+              <a:t> de </a:t>
+            </a:r>
+            <a:r>
+              <a:rPr lang="en-US" dirty="0" err="1" smtClean="0"/>
+              <a:t>integração</a:t>
+            </a:r>
+            <a:r>
+              <a:rPr lang="en-US" dirty="0" smtClean="0"/>
+              <a:t> e </a:t>
+            </a:r>
+            <a:r>
+              <a:rPr lang="en-US" dirty="0" err="1" smtClean="0"/>
+              <a:t>realização</a:t>
+            </a:r>
+            <a:r>
+              <a:rPr lang="en-US" dirty="0" smtClean="0"/>
+              <a:t> de </a:t>
+            </a:r>
+            <a:r>
+              <a:rPr lang="en-US" dirty="0" err="1" smtClean="0"/>
+              <a:t>trasações</a:t>
+            </a:r>
+            <a:r>
+              <a:rPr lang="en-US" dirty="0" smtClean="0"/>
+              <a:t> de </a:t>
+            </a:r>
+            <a:r>
+              <a:rPr lang="en-US" dirty="0" err="1" smtClean="0"/>
+              <a:t>uma</a:t>
+            </a:r>
+            <a:r>
+              <a:rPr lang="en-US" dirty="0" smtClean="0"/>
+              <a:t> </a:t>
+            </a:r>
+            <a:r>
+              <a:rPr lang="en-US" dirty="0" err="1" smtClean="0"/>
+              <a:t>tecnologia</a:t>
+            </a:r>
+            <a:r>
+              <a:rPr lang="en-US" dirty="0" smtClean="0"/>
+              <a:t> com </a:t>
+            </a:r>
+            <a:r>
+              <a:rPr lang="en-US" dirty="0" err="1" smtClean="0"/>
+              <a:t>sua</a:t>
+            </a:r>
+            <a:r>
+              <a:rPr lang="en-US" dirty="0" smtClean="0"/>
+              <a:t> base de dados. </a:t>
+            </a:r>
+          </a:p>
+          <a:p>
+            <a:r>
+              <a:rPr lang="en-US" dirty="0" smtClean="0"/>
+              <a:t>Este </a:t>
+            </a:r>
+            <a:r>
+              <a:rPr lang="en-US" dirty="0" err="1" smtClean="0"/>
+              <a:t>trabalho</a:t>
+            </a:r>
+            <a:r>
+              <a:rPr lang="en-US" dirty="0" smtClean="0"/>
+              <a:t> </a:t>
+            </a:r>
+            <a:r>
+              <a:rPr lang="en-US" dirty="0" err="1" smtClean="0"/>
+              <a:t>toma</a:t>
+            </a:r>
+            <a:r>
+              <a:rPr lang="en-US" dirty="0" smtClean="0"/>
+              <a:t> </a:t>
+            </a:r>
+            <a:r>
+              <a:rPr lang="en-US" dirty="0" err="1" smtClean="0"/>
+              <a:t>como</a:t>
+            </a:r>
+            <a:r>
+              <a:rPr lang="en-US" dirty="0" smtClean="0"/>
+              <a:t> base a </a:t>
+            </a:r>
+            <a:r>
+              <a:rPr lang="en-US" dirty="0" err="1" smtClean="0"/>
+              <a:t>tecnologia</a:t>
+            </a:r>
+            <a:r>
+              <a:rPr lang="en-US" dirty="0" smtClean="0"/>
+              <a:t> de </a:t>
+            </a:r>
+            <a:r>
+              <a:rPr lang="en-US" dirty="0" err="1" smtClean="0"/>
+              <a:t>desenvolvimento</a:t>
+            </a:r>
+            <a:r>
+              <a:rPr lang="en-US" dirty="0" smtClean="0"/>
+              <a:t> Java, de forma </a:t>
+            </a:r>
+            <a:r>
+              <a:rPr lang="en-US" dirty="0" err="1" smtClean="0"/>
+              <a:t>que</a:t>
+            </a:r>
+            <a:r>
+              <a:rPr lang="en-US" dirty="0" smtClean="0"/>
+              <a:t> </a:t>
+            </a:r>
+            <a:r>
+              <a:rPr lang="en-US" dirty="0" err="1" smtClean="0"/>
+              <a:t>seu</a:t>
+            </a:r>
+            <a:r>
+              <a:rPr lang="en-US" dirty="0" smtClean="0"/>
+              <a:t> </a:t>
+            </a:r>
+            <a:r>
+              <a:rPr lang="en-US" dirty="0" err="1" smtClean="0"/>
+              <a:t>objetivo</a:t>
+            </a:r>
+            <a:r>
+              <a:rPr lang="en-US" dirty="0" smtClean="0"/>
+              <a:t> </a:t>
+            </a:r>
+            <a:r>
+              <a:rPr lang="en-US" dirty="0" err="1" smtClean="0"/>
+              <a:t>é</a:t>
+            </a:r>
+            <a:r>
+              <a:rPr lang="en-US" dirty="0" smtClean="0"/>
+              <a:t> </a:t>
+            </a:r>
+            <a:r>
+              <a:rPr lang="en-US" dirty="0" err="1" smtClean="0"/>
+              <a:t>apresentar</a:t>
+            </a:r>
+            <a:r>
+              <a:rPr lang="en-US" dirty="0" smtClean="0"/>
+              <a:t> </a:t>
+            </a:r>
+            <a:r>
+              <a:rPr lang="en-US" dirty="0" err="1" smtClean="0"/>
+              <a:t>uma</a:t>
+            </a:r>
+            <a:r>
+              <a:rPr lang="en-US" dirty="0" smtClean="0"/>
+              <a:t> </a:t>
+            </a:r>
+            <a:r>
+              <a:rPr lang="en-US" dirty="0" err="1" smtClean="0"/>
+              <a:t>ferramenta</a:t>
+            </a:r>
+            <a:r>
+              <a:rPr lang="en-US" dirty="0" smtClean="0"/>
+              <a:t> </a:t>
+            </a:r>
+            <a:r>
+              <a:rPr lang="en-US" dirty="0" err="1" smtClean="0"/>
+              <a:t>que</a:t>
+            </a:r>
+            <a:r>
+              <a:rPr lang="en-US" dirty="0" smtClean="0"/>
+              <a:t> </a:t>
+            </a:r>
+            <a:r>
+              <a:rPr lang="en-US" dirty="0" err="1" smtClean="0"/>
+              <a:t>busca</a:t>
+            </a:r>
+            <a:r>
+              <a:rPr lang="en-US" dirty="0" smtClean="0"/>
+              <a:t> </a:t>
+            </a:r>
+            <a:r>
+              <a:rPr lang="en-US" dirty="0" err="1" smtClean="0"/>
+              <a:t>trazer</a:t>
+            </a:r>
+            <a:r>
+              <a:rPr lang="en-US" dirty="0" smtClean="0"/>
+              <a:t> </a:t>
+            </a:r>
+            <a:r>
+              <a:rPr lang="en-US" dirty="0" err="1" smtClean="0"/>
+              <a:t>agilidade</a:t>
+            </a:r>
+            <a:r>
+              <a:rPr lang="en-US" dirty="0" smtClean="0"/>
+              <a:t> no </a:t>
+            </a:r>
+            <a:r>
+              <a:rPr lang="en-US" dirty="0" err="1" smtClean="0"/>
+              <a:t>processo</a:t>
+            </a:r>
+            <a:r>
+              <a:rPr lang="en-US" dirty="0" smtClean="0"/>
+              <a:t> de </a:t>
+            </a:r>
+            <a:r>
+              <a:rPr lang="en-US" dirty="0" err="1" smtClean="0"/>
+              <a:t>integração</a:t>
+            </a:r>
+            <a:r>
+              <a:rPr lang="en-US" dirty="0" smtClean="0"/>
+              <a:t> da </a:t>
+            </a:r>
+            <a:r>
+              <a:rPr lang="en-US" dirty="0" err="1" smtClean="0"/>
+              <a:t>tecnologia</a:t>
+            </a:r>
+            <a:r>
+              <a:rPr lang="en-US" dirty="0" smtClean="0"/>
+              <a:t> com </a:t>
+            </a:r>
+            <a:r>
+              <a:rPr lang="en-US" dirty="0" err="1" smtClean="0"/>
+              <a:t>qualquer</a:t>
+            </a:r>
+            <a:r>
+              <a:rPr lang="en-US" dirty="0" smtClean="0"/>
+              <a:t> base de dados.</a:t>
+            </a:r>
+          </a:p>
+          <a:p>
+            <a:r>
+              <a:rPr lang="en-US" dirty="0"/>
+              <a:t>	</a:t>
+            </a:r>
+            <a:r>
+              <a:rPr lang="en-US" dirty="0" err="1" smtClean="0"/>
+              <a:t>É</a:t>
+            </a:r>
+            <a:r>
+              <a:rPr lang="en-US" dirty="0" smtClean="0"/>
+              <a:t> </a:t>
+            </a:r>
+            <a:r>
+              <a:rPr lang="en-US" dirty="0" err="1" smtClean="0"/>
+              <a:t>uma</a:t>
+            </a:r>
+            <a:r>
+              <a:rPr lang="en-US" dirty="0" smtClean="0"/>
+              <a:t> </a:t>
+            </a:r>
+            <a:r>
+              <a:rPr lang="en-US" dirty="0" err="1" smtClean="0"/>
+              <a:t>ferramenta</a:t>
+            </a:r>
+            <a:r>
+              <a:rPr lang="en-US" dirty="0" smtClean="0"/>
+              <a:t> </a:t>
+            </a:r>
+            <a:r>
+              <a:rPr lang="en-US" dirty="0" err="1" smtClean="0"/>
+              <a:t>desenvolvida</a:t>
+            </a:r>
+            <a:r>
+              <a:rPr lang="en-US" dirty="0" smtClean="0"/>
+              <a:t> para </a:t>
+            </a:r>
+            <a:r>
+              <a:rPr lang="en-US" dirty="0" err="1" smtClean="0"/>
+              <a:t>profissionais</a:t>
+            </a:r>
+            <a:r>
+              <a:rPr lang="en-US" dirty="0" smtClean="0"/>
+              <a:t> da </a:t>
+            </a:r>
+            <a:r>
+              <a:rPr lang="en-US" dirty="0" err="1" smtClean="0"/>
+              <a:t>área</a:t>
+            </a:r>
+            <a:r>
+              <a:rPr lang="en-US" dirty="0" smtClean="0"/>
+              <a:t> de </a:t>
+            </a:r>
+            <a:r>
+              <a:rPr lang="en-US" dirty="0" err="1" smtClean="0"/>
+              <a:t>programação</a:t>
+            </a:r>
+            <a:r>
+              <a:rPr lang="en-US" dirty="0" smtClean="0"/>
+              <a:t>, </a:t>
+            </a:r>
+            <a:r>
+              <a:rPr lang="en-US" dirty="0" err="1" smtClean="0"/>
+              <a:t>que</a:t>
+            </a:r>
+            <a:r>
+              <a:rPr lang="en-US" dirty="0" smtClean="0"/>
+              <a:t> </a:t>
+            </a:r>
+            <a:r>
+              <a:rPr lang="en-US" dirty="0" err="1" smtClean="0"/>
+              <a:t>atuem</a:t>
+            </a:r>
+            <a:r>
+              <a:rPr lang="en-US" dirty="0" smtClean="0"/>
+              <a:t> com </a:t>
+            </a:r>
+            <a:r>
+              <a:rPr lang="en-US" dirty="0" err="1" smtClean="0"/>
+              <a:t>unicamente</a:t>
+            </a:r>
+            <a:r>
+              <a:rPr lang="en-US" dirty="0" smtClean="0"/>
+              <a:t> com </a:t>
+            </a:r>
+            <a:r>
+              <a:rPr lang="en-US" dirty="0" err="1" smtClean="0"/>
+              <a:t>desenvolvimento</a:t>
+            </a:r>
+            <a:r>
+              <a:rPr lang="en-US" dirty="0" smtClean="0"/>
+              <a:t> de </a:t>
+            </a:r>
+            <a:r>
+              <a:rPr lang="en-US" dirty="0" err="1" smtClean="0"/>
+              <a:t>aplicações</a:t>
+            </a:r>
+            <a:r>
+              <a:rPr lang="en-US" dirty="0" smtClean="0"/>
+              <a:t> da </a:t>
+            </a:r>
+            <a:r>
+              <a:rPr lang="en-US" dirty="0" err="1" smtClean="0"/>
+              <a:t>tecnologia</a:t>
+            </a:r>
+            <a:r>
+              <a:rPr lang="en-US" dirty="0" smtClean="0"/>
+              <a:t> Java.</a:t>
+            </a:r>
+          </a:p>
+          <a:p>
+            <a:r>
+              <a:rPr lang="en-US" dirty="0"/>
+              <a:t>	</a:t>
+            </a:r>
+            <a:r>
+              <a:rPr lang="en-US" dirty="0" err="1" smtClean="0"/>
+              <a:t>Nomeado</a:t>
+            </a:r>
+            <a:r>
+              <a:rPr lang="en-US" dirty="0" smtClean="0"/>
+              <a:t> de </a:t>
+            </a:r>
+            <a:r>
+              <a:rPr lang="en-US" dirty="0" err="1" smtClean="0"/>
+              <a:t>SigmaDB</a:t>
+            </a:r>
+            <a:r>
+              <a:rPr lang="en-US" dirty="0" smtClean="0"/>
+              <a:t>, </a:t>
+            </a:r>
+            <a:r>
+              <a:rPr lang="en-US" dirty="0" err="1" smtClean="0"/>
+              <a:t>este</a:t>
+            </a:r>
+            <a:r>
+              <a:rPr lang="en-US" dirty="0" smtClean="0"/>
+              <a:t> framework </a:t>
+            </a:r>
+            <a:r>
+              <a:rPr lang="en-US" dirty="0" err="1" smtClean="0"/>
+              <a:t>objetiva</a:t>
+            </a:r>
+            <a:r>
+              <a:rPr lang="en-US" dirty="0" smtClean="0"/>
+              <a:t> </a:t>
+            </a:r>
+            <a:r>
+              <a:rPr lang="en-US" dirty="0" err="1" smtClean="0"/>
+              <a:t>ser</a:t>
+            </a:r>
+            <a:r>
+              <a:rPr lang="en-US" dirty="0" smtClean="0"/>
+              <a:t> </a:t>
+            </a:r>
+            <a:r>
+              <a:rPr lang="en-US" dirty="0" err="1" smtClean="0"/>
+              <a:t>uma</a:t>
+            </a:r>
+            <a:r>
+              <a:rPr lang="en-US" dirty="0" smtClean="0"/>
+              <a:t> </a:t>
+            </a:r>
+            <a:r>
+              <a:rPr lang="en-US" dirty="0" err="1" smtClean="0"/>
+              <a:t>ponte</a:t>
+            </a:r>
+            <a:r>
+              <a:rPr lang="en-US" dirty="0" smtClean="0"/>
+              <a:t> </a:t>
+            </a:r>
+            <a:r>
+              <a:rPr lang="en-US" dirty="0" err="1" smtClean="0"/>
+              <a:t>única</a:t>
+            </a:r>
+            <a:r>
+              <a:rPr lang="en-US" dirty="0" smtClean="0"/>
+              <a:t> de </a:t>
+            </a:r>
+            <a:r>
+              <a:rPr lang="en-US" dirty="0" err="1" smtClean="0"/>
+              <a:t>acesso</a:t>
+            </a:r>
+            <a:r>
+              <a:rPr lang="en-US" dirty="0" smtClean="0"/>
+              <a:t> entre a </a:t>
+            </a:r>
+            <a:r>
+              <a:rPr lang="en-US" dirty="0" err="1" smtClean="0"/>
+              <a:t>tecnologia</a:t>
+            </a:r>
+            <a:r>
+              <a:rPr lang="en-US" dirty="0" smtClean="0"/>
+              <a:t> Java e </a:t>
+            </a:r>
+            <a:r>
+              <a:rPr lang="en-US" dirty="0" err="1" smtClean="0"/>
+              <a:t>qualquer</a:t>
+            </a:r>
+            <a:r>
+              <a:rPr lang="en-US" dirty="0" smtClean="0"/>
+              <a:t> Sistema </a:t>
+            </a:r>
+            <a:r>
+              <a:rPr lang="en-US" dirty="0" err="1" smtClean="0"/>
+              <a:t>gerenciador</a:t>
+            </a:r>
+            <a:r>
+              <a:rPr lang="en-US" dirty="0" smtClean="0"/>
+              <a:t> de banco de dados </a:t>
+            </a:r>
+            <a:r>
+              <a:rPr lang="en-US" dirty="0" err="1" smtClean="0"/>
+              <a:t>relacional</a:t>
+            </a:r>
+            <a:r>
+              <a:rPr lang="en-US" dirty="0" smtClean="0"/>
+              <a:t>. </a:t>
+            </a:r>
+            <a:r>
+              <a:rPr lang="en-US" dirty="0" err="1" smtClean="0"/>
+              <a:t>Convertendo</a:t>
+            </a:r>
+            <a:r>
+              <a:rPr lang="en-US" dirty="0" smtClean="0"/>
+              <a:t> o </a:t>
+            </a:r>
+            <a:r>
+              <a:rPr lang="en-US" dirty="0" err="1" smtClean="0"/>
+              <a:t>paradigma</a:t>
+            </a:r>
+            <a:r>
+              <a:rPr lang="en-US" dirty="0" smtClean="0"/>
+              <a:t> de </a:t>
+            </a:r>
+            <a:r>
+              <a:rPr lang="en-US" dirty="0" err="1" smtClean="0"/>
+              <a:t>Orientação</a:t>
+            </a:r>
+            <a:r>
+              <a:rPr lang="en-US" dirty="0" smtClean="0"/>
+              <a:t> a </a:t>
+            </a:r>
+            <a:r>
+              <a:rPr lang="en-US" dirty="0" err="1" smtClean="0"/>
+              <a:t>objeto</a:t>
+            </a:r>
+            <a:r>
+              <a:rPr lang="en-US" dirty="0" smtClean="0"/>
+              <a:t> </a:t>
+            </a:r>
+            <a:r>
+              <a:rPr lang="en-US" dirty="0" err="1" smtClean="0"/>
+              <a:t>em</a:t>
+            </a:r>
+            <a:r>
+              <a:rPr lang="en-US" dirty="0" smtClean="0"/>
+              <a:t> </a:t>
+            </a:r>
+            <a:r>
+              <a:rPr lang="en-US" dirty="0" err="1" smtClean="0"/>
+              <a:t>sintáxes</a:t>
+            </a:r>
+            <a:r>
+              <a:rPr lang="en-US" dirty="0" smtClean="0"/>
+              <a:t> SQL de forma </a:t>
+            </a:r>
+            <a:r>
+              <a:rPr lang="en-US" dirty="0" err="1" smtClean="0"/>
+              <a:t>automática</a:t>
+            </a:r>
+            <a:r>
+              <a:rPr lang="en-US" dirty="0" smtClean="0"/>
+              <a:t>, </a:t>
+            </a:r>
+            <a:r>
+              <a:rPr lang="en-US" dirty="0" err="1" smtClean="0"/>
+              <a:t>dentre</a:t>
+            </a:r>
+            <a:r>
+              <a:rPr lang="en-US" dirty="0" smtClean="0"/>
+              <a:t> </a:t>
+            </a:r>
+            <a:r>
+              <a:rPr lang="en-US" dirty="0" err="1" smtClean="0"/>
+              <a:t>suas</a:t>
+            </a:r>
+            <a:r>
+              <a:rPr lang="en-US" dirty="0" smtClean="0"/>
+              <a:t> </a:t>
+            </a:r>
+            <a:r>
+              <a:rPr lang="en-US" dirty="0" err="1" smtClean="0"/>
+              <a:t>principais</a:t>
+            </a:r>
+            <a:r>
+              <a:rPr lang="en-US" dirty="0" smtClean="0"/>
+              <a:t> </a:t>
+            </a:r>
+            <a:r>
+              <a:rPr lang="en-US" dirty="0" err="1" smtClean="0"/>
+              <a:t>metas</a:t>
+            </a:r>
+            <a:r>
+              <a:rPr lang="en-US" dirty="0" smtClean="0"/>
+              <a:t> a se </a:t>
+            </a:r>
+            <a:r>
+              <a:rPr lang="en-US" dirty="0" err="1" smtClean="0"/>
+              <a:t>atingir</a:t>
+            </a:r>
+            <a:r>
+              <a:rPr lang="en-US" dirty="0" smtClean="0"/>
+              <a:t>, </a:t>
+            </a:r>
+            <a:r>
+              <a:rPr lang="en-US" dirty="0" err="1" smtClean="0"/>
+              <a:t>pode</a:t>
+            </a:r>
+            <a:r>
+              <a:rPr lang="en-US" dirty="0" smtClean="0"/>
+              <a:t>-se </a:t>
+            </a:r>
+            <a:r>
+              <a:rPr lang="en-US" dirty="0" err="1" smtClean="0"/>
+              <a:t>dar</a:t>
+            </a:r>
+            <a:r>
+              <a:rPr lang="en-US" dirty="0" smtClean="0"/>
+              <a:t> </a:t>
+            </a:r>
+            <a:r>
+              <a:rPr lang="en-US" dirty="0" err="1" smtClean="0"/>
+              <a:t>ênfase</a:t>
+            </a:r>
+            <a:r>
+              <a:rPr lang="en-US" dirty="0" smtClean="0"/>
+              <a:t> </a:t>
+            </a:r>
+            <a:r>
+              <a:rPr lang="en-US" dirty="0" err="1" smtClean="0"/>
+              <a:t>na</a:t>
+            </a:r>
+            <a:r>
+              <a:rPr lang="en-US" dirty="0" smtClean="0"/>
+              <a:t> </a:t>
+            </a:r>
+            <a:r>
+              <a:rPr lang="en-US" dirty="0" err="1" smtClean="0"/>
+              <a:t>agilidade</a:t>
+            </a:r>
+            <a:r>
+              <a:rPr lang="en-US" dirty="0" smtClean="0"/>
+              <a:t> de </a:t>
+            </a:r>
+            <a:r>
+              <a:rPr lang="en-US" dirty="0" err="1" smtClean="0"/>
+              <a:t>integração</a:t>
+            </a:r>
+            <a:r>
+              <a:rPr lang="en-US" dirty="0"/>
+              <a:t> </a:t>
+            </a:r>
+            <a:r>
+              <a:rPr lang="en-US" dirty="0" smtClean="0"/>
+              <a:t>e </a:t>
+            </a:r>
+            <a:r>
+              <a:rPr lang="en-US" dirty="0" err="1" smtClean="0"/>
+              <a:t>desenvolvimento</a:t>
+            </a:r>
+            <a:r>
+              <a:rPr lang="en-US" dirty="0" smtClean="0"/>
+              <a:t> de </a:t>
+            </a:r>
+            <a:r>
+              <a:rPr lang="en-US" dirty="0" err="1" smtClean="0"/>
+              <a:t>códigos</a:t>
+            </a:r>
+            <a:r>
+              <a:rPr lang="en-US" dirty="0" smtClean="0"/>
+              <a:t>, </a:t>
+            </a:r>
+            <a:r>
+              <a:rPr lang="en-US" dirty="0" err="1" smtClean="0"/>
+              <a:t>construção</a:t>
+            </a:r>
+            <a:r>
+              <a:rPr lang="en-US" dirty="0" smtClean="0"/>
+              <a:t> de </a:t>
+            </a:r>
+            <a:r>
+              <a:rPr lang="en-US" dirty="0" err="1" smtClean="0"/>
+              <a:t>códigos</a:t>
+            </a:r>
+            <a:r>
+              <a:rPr lang="en-US" dirty="0" smtClean="0"/>
+              <a:t> </a:t>
+            </a:r>
+            <a:r>
+              <a:rPr lang="en-US" dirty="0" err="1" smtClean="0"/>
+              <a:t>coesos</a:t>
+            </a:r>
+            <a:r>
+              <a:rPr lang="en-US" dirty="0" smtClean="0"/>
+              <a:t> e </a:t>
+            </a:r>
+            <a:r>
+              <a:rPr lang="en-US" dirty="0" err="1" smtClean="0"/>
+              <a:t>bem</a:t>
+            </a:r>
+            <a:r>
+              <a:rPr lang="en-US" dirty="0" smtClean="0"/>
+              <a:t> </a:t>
+            </a:r>
+            <a:r>
+              <a:rPr lang="en-US" dirty="0" err="1" smtClean="0"/>
+              <a:t>estruturados</a:t>
+            </a:r>
+            <a:r>
+              <a:rPr lang="en-US" dirty="0" smtClean="0"/>
+              <a:t>.</a:t>
+            </a:r>
+          </a:p>
+          <a:p>
+            <a:r>
+              <a:rPr lang="en-US" dirty="0"/>
+              <a:t>	</a:t>
+            </a:r>
+            <a:endParaRPr lang="en-US" dirty="0" smtClean="0"/>
+          </a:p>
+        </p:txBody>
+      </p:sp>
     </p:spTree>
     <p:extLst>
       <p:ext uri="{BB962C8B-B14F-4D97-AF65-F5344CB8AC3E}">
-        <p14:creationId xmlns:p14="http://schemas.microsoft.com/office/powerpoint/2010/main" val="930346935"/>
+        <p14:creationId xmlns:p14="http://schemas.microsoft.com/office/powerpoint/2010/main" val="1060811538"/>
       </p:ext>
     </p:extLst>
   </p:cSld>

</xml_diff>

<commit_message>
Versão finalizada do tcc
</commit_message>
<xml_diff>
--- a/Apresentação.pptx
+++ b/Apresentação.pptx
@@ -8,7 +8,8 @@
     <p:sldId id="256" r:id="rId2"/>
     <p:sldId id="257" r:id="rId3"/>
     <p:sldId id="258" r:id="rId4"/>
-    <p:sldId id="259" r:id="rId5"/>
+    <p:sldId id="260" r:id="rId5"/>
+    <p:sldId id="259" r:id="rId6"/>
   </p:sldIdLst>
   <p:sldSz cx="12192000" cy="6858000"/>
   <p:notesSz cx="6858000" cy="9144000"/>
@@ -740,7 +741,7 @@
           <a:p>
             <a:fld id="{BD90B61F-930A-2248-84EC-669398F343B2}" type="datetimeFigureOut">
               <a:rPr lang="pt-BR" smtClean="0"/>
-              <a:t>15/05/17</a:t>
+              <a:t>16/05/17</a:t>
             </a:fld>
             <a:endParaRPr lang="pt-BR"/>
           </a:p>
@@ -946,7 +947,7 @@
           <a:p>
             <a:fld id="{BD90B61F-930A-2248-84EC-669398F343B2}" type="datetimeFigureOut">
               <a:rPr lang="pt-BR" smtClean="0"/>
-              <a:t>15/05/17</a:t>
+              <a:t>16/05/17</a:t>
             </a:fld>
             <a:endParaRPr lang="pt-BR"/>
           </a:p>
@@ -1136,7 +1137,7 @@
           <a:p>
             <a:fld id="{BD90B61F-930A-2248-84EC-669398F343B2}" type="datetimeFigureOut">
               <a:rPr lang="pt-BR" smtClean="0"/>
-              <a:t>15/05/17</a:t>
+              <a:t>16/05/17</a:t>
             </a:fld>
             <a:endParaRPr lang="pt-BR"/>
           </a:p>
@@ -1296,7 +1297,7 @@
           <a:p>
             <a:fld id="{BD90B61F-930A-2248-84EC-669398F343B2}" type="datetimeFigureOut">
               <a:rPr lang="pt-BR" smtClean="0"/>
-              <a:t>15/05/17</a:t>
+              <a:t>16/05/17</a:t>
             </a:fld>
             <a:endParaRPr lang="pt-BR"/>
           </a:p>
@@ -1551,7 +1552,7 @@
           <a:p>
             <a:fld id="{BD90B61F-930A-2248-84EC-669398F343B2}" type="datetimeFigureOut">
               <a:rPr lang="pt-BR" smtClean="0"/>
-              <a:t>15/05/17</a:t>
+              <a:t>16/05/17</a:t>
             </a:fld>
             <a:endParaRPr lang="pt-BR"/>
           </a:p>
@@ -1965,7 +1966,7 @@
           <a:p>
             <a:fld id="{BD90B61F-930A-2248-84EC-669398F343B2}" type="datetimeFigureOut">
               <a:rPr lang="pt-BR" smtClean="0"/>
-              <a:t>15/05/17</a:t>
+              <a:t>16/05/17</a:t>
             </a:fld>
             <a:endParaRPr lang="pt-BR"/>
           </a:p>
@@ -2411,7 +2412,7 @@
           <a:p>
             <a:fld id="{BD90B61F-930A-2248-84EC-669398F343B2}" type="datetimeFigureOut">
               <a:rPr lang="pt-BR" smtClean="0"/>
-              <a:t>15/05/17</a:t>
+              <a:t>16/05/17</a:t>
             </a:fld>
             <a:endParaRPr lang="pt-BR"/>
           </a:p>
@@ -2512,7 +2513,7 @@
           <a:p>
             <a:fld id="{BD90B61F-930A-2248-84EC-669398F343B2}" type="datetimeFigureOut">
               <a:rPr lang="pt-BR" smtClean="0"/>
-              <a:t>15/05/17</a:t>
+              <a:t>16/05/17</a:t>
             </a:fld>
             <a:endParaRPr lang="pt-BR"/>
           </a:p>
@@ -2638,7 +2639,7 @@
           <a:p>
             <a:fld id="{BD90B61F-930A-2248-84EC-669398F343B2}" type="datetimeFigureOut">
               <a:rPr lang="pt-BR" smtClean="0"/>
-              <a:t>15/05/17</a:t>
+              <a:t>16/05/17</a:t>
             </a:fld>
             <a:endParaRPr lang="pt-BR"/>
           </a:p>
@@ -2912,7 +2913,7 @@
           <a:p>
             <a:fld id="{BD90B61F-930A-2248-84EC-669398F343B2}" type="datetimeFigureOut">
               <a:rPr lang="pt-BR" smtClean="0"/>
-              <a:t>15/05/17</a:t>
+              <a:t>16/05/17</a:t>
             </a:fld>
             <a:endParaRPr lang="pt-BR"/>
           </a:p>
@@ -3117,7 +3118,7 @@
           <a:p>
             <a:fld id="{BD90B61F-930A-2248-84EC-669398F343B2}" type="datetimeFigureOut">
               <a:rPr lang="pt-BR" smtClean="0"/>
-              <a:t>15/05/17</a:t>
+              <a:t>16/05/17</a:t>
             </a:fld>
             <a:endParaRPr lang="pt-BR"/>
           </a:p>
@@ -4231,7 +4232,7 @@
           <a:p>
             <a:fld id="{BD90B61F-930A-2248-84EC-669398F343B2}" type="datetimeFigureOut">
               <a:rPr lang="pt-BR" smtClean="0"/>
-              <a:t>15/05/17</a:t>
+              <a:t>16/05/17</a:t>
             </a:fld>
             <a:endParaRPr lang="pt-BR"/>
           </a:p>
@@ -4721,15 +4722,7 @@
                   <a:schemeClr val="tx1"/>
                 </a:solidFill>
               </a:rPr>
-              <a:t>TRABALHO DE CONCLUS</a:t>
-            </a:r>
-            <a:r>
-              <a:rPr lang="en-US" sz="2800" dirty="0" smtClean="0">
-                <a:solidFill>
-                  <a:schemeClr val="tx1"/>
-                </a:solidFill>
-              </a:rPr>
-              <a:t>ÃO DE CURSO</a:t>
+              <a:t>TRABALHO DE CONCLUSÃO DE CURSO</a:t>
             </a:r>
             <a:endParaRPr lang="pt-BR" sz="2800" dirty="0">
               <a:solidFill>
@@ -4902,15 +4895,7 @@
                   <a:schemeClr val="tx1"/>
                 </a:solidFill>
               </a:rPr>
-              <a:t>Universit</a:t>
-            </a:r>
-            <a:r>
-              <a:rPr lang="en-US" sz="3200" dirty="0" err="1" smtClean="0">
-                <a:solidFill>
-                  <a:schemeClr val="tx1"/>
-                </a:solidFill>
-              </a:rPr>
-              <a:t>ário</a:t>
+              <a:t>Universitário</a:t>
             </a:r>
             <a:r>
               <a:rPr lang="en-US" sz="3200" dirty="0" smtClean="0">
@@ -5591,6 +5576,900 @@
 </file>
 
 <file path=ppt/slides/slide4.xml><?xml version="1.0" encoding="utf-8"?>
+<p:sld xmlns:a="http://schemas.openxmlformats.org/drawingml/2006/main" xmlns:r="http://schemas.openxmlformats.org/officeDocument/2006/relationships" xmlns:p="http://schemas.openxmlformats.org/presentationml/2006/main">
+  <p:cSld>
+    <p:spTree>
+      <p:nvGrpSpPr>
+        <p:cNvPr id="1" name=""/>
+        <p:cNvGrpSpPr/>
+        <p:nvPr/>
+      </p:nvGrpSpPr>
+      <p:grpSpPr>
+        <a:xfrm>
+          <a:off x="0" y="0"/>
+          <a:ext cx="0" cy="0"/>
+          <a:chOff x="0" y="0"/>
+          <a:chExt cx="0" cy="0"/>
+        </a:xfrm>
+      </p:grpSpPr>
+      <p:pic>
+        <p:nvPicPr>
+          <p:cNvPr id="5" name="Imagem 4"/>
+          <p:cNvPicPr/>
+          <p:nvPr/>
+        </p:nvPicPr>
+        <p:blipFill>
+          <a:blip r:embed="rId2"/>
+          <a:stretch>
+            <a:fillRect/>
+          </a:stretch>
+        </p:blipFill>
+        <p:spPr bwMode="auto">
+          <a:xfrm>
+            <a:off x="10975170" y="0"/>
+            <a:ext cx="1038155" cy="944084"/>
+          </a:xfrm>
+          <a:prstGeom prst="rect">
+            <a:avLst/>
+          </a:prstGeom>
+        </p:spPr>
+      </p:pic>
+      <p:pic>
+        <p:nvPicPr>
+          <p:cNvPr id="6" name="Imagem 5"/>
+          <p:cNvPicPr/>
+          <p:nvPr/>
+        </p:nvPicPr>
+        <p:blipFill>
+          <a:blip r:embed="rId3"/>
+          <a:stretch>
+            <a:fillRect/>
+          </a:stretch>
+        </p:blipFill>
+        <p:spPr bwMode="auto">
+          <a:xfrm>
+            <a:off x="10975170" y="846138"/>
+            <a:ext cx="1038155" cy="568817"/>
+          </a:xfrm>
+          <a:prstGeom prst="rect">
+            <a:avLst/>
+          </a:prstGeom>
+        </p:spPr>
+      </p:pic>
+      <p:sp>
+        <p:nvSpPr>
+          <p:cNvPr id="2" name="Título 1"/>
+          <p:cNvSpPr>
+            <a:spLocks noGrp="1"/>
+          </p:cNvSpPr>
+          <p:nvPr>
+            <p:ph type="title"/>
+          </p:nvPr>
+        </p:nvSpPr>
+        <p:spPr>
+          <a:xfrm>
+            <a:off x="609600" y="274638"/>
+            <a:ext cx="9964981" cy="1143000"/>
+          </a:xfrm>
+        </p:spPr>
+        <p:txBody>
+          <a:bodyPr>
+            <a:normAutofit/>
+          </a:bodyPr>
+          <a:lstStyle/>
+          <a:p>
+            <a:pPr algn="ctr"/>
+            <a:r>
+              <a:rPr lang="pt-BR" sz="2400" dirty="0">
+                <a:solidFill>
+                  <a:schemeClr val="tx1"/>
+                </a:solidFill>
+              </a:rPr>
+              <a:t>ESTRAT</a:t>
+            </a:r>
+            <a:r>
+              <a:rPr lang="en-US" sz="2400" dirty="0">
+                <a:solidFill>
+                  <a:schemeClr val="tx1"/>
+                </a:solidFill>
+              </a:rPr>
+              <a:t>ÉGIA DE SOFTWARE NA TECNOLOGIA JAVA: AUTOMAÇÃO DE TRANSAÇÕES EM SGBD’S RELACIONAIS</a:t>
+            </a:r>
+            <a:endParaRPr lang="pt-BR" sz="2400" dirty="0"/>
+          </a:p>
+        </p:txBody>
+      </p:sp>
+      <p:sp>
+        <p:nvSpPr>
+          <p:cNvPr id="7" name="Título 1"/>
+          <p:cNvSpPr txBox="1">
+            <a:spLocks/>
+          </p:cNvSpPr>
+          <p:nvPr/>
+        </p:nvSpPr>
+        <p:spPr>
+          <a:xfrm>
+            <a:off x="609600" y="1414954"/>
+            <a:ext cx="11403725" cy="4471495"/>
+          </a:xfrm>
+          <a:prstGeom prst="rect">
+            <a:avLst/>
+          </a:prstGeom>
+        </p:spPr>
+        <p:txBody>
+          <a:bodyPr vert="horz" rtlCol="0" anchor="ctr">
+            <a:normAutofit fontScale="85000" lnSpcReduction="20000"/>
+            <a:scene3d>
+              <a:camera prst="orthographicFront"/>
+              <a:lightRig rig="soft" dir="t"/>
+            </a:scene3d>
+            <a:sp3d prstMaterial="softEdge">
+              <a:bevelT w="25400" h="25400"/>
+            </a:sp3d>
+          </a:bodyPr>
+          <a:lstStyle>
+            <a:lvl1pPr algn="l" rtl="0" eaLnBrk="1" latinLnBrk="0" hangingPunct="1">
+              <a:spcBef>
+                <a:spcPct val="0"/>
+              </a:spcBef>
+              <a:buNone/>
+              <a:defRPr kumimoji="0" sz="4100" b="1" kern="1200">
+                <a:solidFill>
+                  <a:schemeClr val="tx2"/>
+                </a:solidFill>
+                <a:effectLst>
+                  <a:outerShdw blurRad="31750" dist="25400" dir="5400000" algn="tl" rotWithShape="0">
+                    <a:srgbClr val="000000">
+                      <a:alpha val="25000"/>
+                    </a:srgbClr>
+                  </a:outerShdw>
+                </a:effectLst>
+                <a:latin typeface="+mj-lt"/>
+                <a:ea typeface="+mj-ea"/>
+                <a:cs typeface="+mj-cs"/>
+              </a:defRPr>
+            </a:lvl1pPr>
+            <a:extLst/>
+          </a:lstStyle>
+          <a:p>
+            <a:pPr marL="285750" indent="-285750">
+              <a:buFont typeface="Wingdings" charset="2"/>
+              <a:buChar char="Ø"/>
+            </a:pPr>
+            <a:r>
+              <a:rPr lang="en-US" sz="3200" dirty="0" err="1"/>
+              <a:t>Resumo</a:t>
+            </a:r>
+            <a:endParaRPr lang="en-US" sz="3200" dirty="0"/>
+          </a:p>
+          <a:p>
+            <a:endParaRPr lang="en-US" sz="3200" dirty="0"/>
+          </a:p>
+          <a:p>
+            <a:r>
+              <a:rPr lang="en-US" sz="2400" dirty="0"/>
+              <a:t>	Uma das </a:t>
+            </a:r>
+            <a:r>
+              <a:rPr lang="en-US" sz="2400" dirty="0" err="1"/>
+              <a:t>etapas</a:t>
+            </a:r>
+            <a:r>
+              <a:rPr lang="en-US" sz="2400" dirty="0"/>
+              <a:t> do </a:t>
+            </a:r>
+            <a:r>
+              <a:rPr lang="en-US" sz="2400" dirty="0" err="1"/>
+              <a:t>trabalho</a:t>
+            </a:r>
+            <a:r>
+              <a:rPr lang="en-US" sz="2400" dirty="0"/>
+              <a:t> de </a:t>
+            </a:r>
+            <a:r>
+              <a:rPr lang="en-US" sz="2400" dirty="0" err="1"/>
+              <a:t>desenvolvimento</a:t>
+            </a:r>
+            <a:r>
+              <a:rPr lang="en-US" sz="2400" dirty="0"/>
+              <a:t> de </a:t>
+            </a:r>
+            <a:r>
+              <a:rPr lang="en-US" sz="2400" dirty="0" err="1"/>
+              <a:t>todo</a:t>
+            </a:r>
+            <a:r>
+              <a:rPr lang="en-US" sz="2400" dirty="0"/>
+              <a:t> software </a:t>
+            </a:r>
+            <a:r>
+              <a:rPr lang="en-US" sz="2400" dirty="0" err="1"/>
+              <a:t>é</a:t>
+            </a:r>
+            <a:r>
+              <a:rPr lang="en-US" sz="2400" dirty="0"/>
+              <a:t> a </a:t>
+            </a:r>
+            <a:r>
+              <a:rPr lang="en-US" sz="2400" dirty="0" err="1"/>
+              <a:t>montagem</a:t>
+            </a:r>
+            <a:r>
+              <a:rPr lang="en-US" sz="2400" dirty="0"/>
+              <a:t> das </a:t>
+            </a:r>
+            <a:r>
+              <a:rPr lang="en-US" sz="2400" dirty="0" err="1"/>
+              <a:t>estruturas</a:t>
+            </a:r>
+            <a:r>
+              <a:rPr lang="en-US" sz="2400" dirty="0"/>
+              <a:t> de </a:t>
+            </a:r>
+            <a:r>
+              <a:rPr lang="en-US" sz="2400" dirty="0" err="1"/>
+              <a:t>integração</a:t>
+            </a:r>
+            <a:r>
+              <a:rPr lang="en-US" sz="2400" dirty="0"/>
+              <a:t> e </a:t>
+            </a:r>
+            <a:r>
+              <a:rPr lang="en-US" sz="2400" dirty="0" err="1"/>
+              <a:t>realização</a:t>
+            </a:r>
+            <a:r>
+              <a:rPr lang="en-US" sz="2400" dirty="0"/>
+              <a:t> de </a:t>
+            </a:r>
+            <a:r>
+              <a:rPr lang="en-US" sz="2400" dirty="0" err="1"/>
+              <a:t>trasações</a:t>
+            </a:r>
+            <a:r>
+              <a:rPr lang="en-US" sz="2400" dirty="0"/>
+              <a:t> de </a:t>
+            </a:r>
+            <a:r>
+              <a:rPr lang="en-US" sz="2400" dirty="0" err="1"/>
+              <a:t>uma</a:t>
+            </a:r>
+            <a:r>
+              <a:rPr lang="en-US" sz="2400" dirty="0"/>
+              <a:t> </a:t>
+            </a:r>
+            <a:r>
+              <a:rPr lang="en-US" sz="2400" dirty="0" err="1"/>
+              <a:t>tecnologia</a:t>
+            </a:r>
+            <a:r>
+              <a:rPr lang="en-US" sz="2400" dirty="0"/>
+              <a:t> com </a:t>
+            </a:r>
+            <a:r>
+              <a:rPr lang="en-US" sz="2400" dirty="0" err="1"/>
+              <a:t>sua</a:t>
+            </a:r>
+            <a:r>
+              <a:rPr lang="en-US" sz="2400" dirty="0"/>
+              <a:t> base de dados. </a:t>
+            </a:r>
+          </a:p>
+          <a:p>
+            <a:r>
+              <a:rPr lang="en-US" sz="2400" dirty="0"/>
+              <a:t>Este </a:t>
+            </a:r>
+            <a:r>
+              <a:rPr lang="en-US" sz="2400" dirty="0" err="1"/>
+              <a:t>trabalho</a:t>
+            </a:r>
+            <a:r>
+              <a:rPr lang="en-US" sz="2400" dirty="0"/>
+              <a:t> </a:t>
+            </a:r>
+            <a:r>
+              <a:rPr lang="en-US" sz="2400" dirty="0" err="1"/>
+              <a:t>toma</a:t>
+            </a:r>
+            <a:r>
+              <a:rPr lang="en-US" sz="2400" dirty="0"/>
+              <a:t> </a:t>
+            </a:r>
+            <a:r>
+              <a:rPr lang="en-US" sz="2400" dirty="0" err="1"/>
+              <a:t>como</a:t>
+            </a:r>
+            <a:r>
+              <a:rPr lang="en-US" sz="2400" dirty="0"/>
+              <a:t> base a </a:t>
+            </a:r>
+            <a:r>
+              <a:rPr lang="en-US" sz="2400" dirty="0" err="1"/>
+              <a:t>tecnologia</a:t>
+            </a:r>
+            <a:r>
+              <a:rPr lang="en-US" sz="2400" dirty="0"/>
+              <a:t> de </a:t>
+            </a:r>
+            <a:r>
+              <a:rPr lang="en-US" sz="2400" dirty="0" err="1"/>
+              <a:t>desenvolvimento</a:t>
+            </a:r>
+            <a:r>
+              <a:rPr lang="en-US" sz="2400" dirty="0"/>
+              <a:t> Java, de forma </a:t>
+            </a:r>
+            <a:r>
+              <a:rPr lang="en-US" sz="2400" dirty="0" err="1"/>
+              <a:t>que</a:t>
+            </a:r>
+            <a:r>
+              <a:rPr lang="en-US" sz="2400" dirty="0"/>
+              <a:t> </a:t>
+            </a:r>
+            <a:r>
+              <a:rPr lang="en-US" sz="2400" dirty="0" err="1"/>
+              <a:t>seu</a:t>
+            </a:r>
+            <a:r>
+              <a:rPr lang="en-US" sz="2400" dirty="0"/>
+              <a:t> </a:t>
+            </a:r>
+            <a:r>
+              <a:rPr lang="en-US" sz="2400" dirty="0" err="1"/>
+              <a:t>objetivo</a:t>
+            </a:r>
+            <a:r>
+              <a:rPr lang="en-US" sz="2400" dirty="0"/>
+              <a:t> </a:t>
+            </a:r>
+            <a:r>
+              <a:rPr lang="en-US" sz="2400" dirty="0" err="1"/>
+              <a:t>é</a:t>
+            </a:r>
+            <a:r>
+              <a:rPr lang="en-US" sz="2400" dirty="0"/>
+              <a:t> </a:t>
+            </a:r>
+            <a:r>
+              <a:rPr lang="en-US" sz="2400" dirty="0" err="1"/>
+              <a:t>apresentar</a:t>
+            </a:r>
+            <a:r>
+              <a:rPr lang="en-US" sz="2400" dirty="0"/>
+              <a:t> </a:t>
+            </a:r>
+            <a:r>
+              <a:rPr lang="en-US" sz="2400" dirty="0" err="1"/>
+              <a:t>uma</a:t>
+            </a:r>
+            <a:r>
+              <a:rPr lang="en-US" sz="2400" dirty="0"/>
+              <a:t> </a:t>
+            </a:r>
+            <a:r>
+              <a:rPr lang="en-US" sz="2400" dirty="0" err="1"/>
+              <a:t>ferramenta</a:t>
+            </a:r>
+            <a:r>
+              <a:rPr lang="en-US" sz="2400" dirty="0"/>
+              <a:t> </a:t>
+            </a:r>
+            <a:r>
+              <a:rPr lang="en-US" sz="2400" dirty="0" err="1"/>
+              <a:t>que</a:t>
+            </a:r>
+            <a:r>
+              <a:rPr lang="en-US" sz="2400" dirty="0"/>
+              <a:t> </a:t>
+            </a:r>
+            <a:r>
+              <a:rPr lang="en-US" sz="2400" dirty="0" err="1"/>
+              <a:t>busca</a:t>
+            </a:r>
+            <a:r>
+              <a:rPr lang="en-US" sz="2400" dirty="0"/>
+              <a:t> </a:t>
+            </a:r>
+            <a:r>
+              <a:rPr lang="en-US" sz="2400" dirty="0" err="1"/>
+              <a:t>trazer</a:t>
+            </a:r>
+            <a:r>
+              <a:rPr lang="en-US" sz="2400" dirty="0"/>
+              <a:t> </a:t>
+            </a:r>
+            <a:r>
+              <a:rPr lang="en-US" sz="2400" dirty="0" err="1"/>
+              <a:t>agilidade</a:t>
+            </a:r>
+            <a:r>
+              <a:rPr lang="en-US" sz="2400" dirty="0"/>
+              <a:t> no </a:t>
+            </a:r>
+            <a:r>
+              <a:rPr lang="en-US" sz="2400" dirty="0" err="1"/>
+              <a:t>processo</a:t>
+            </a:r>
+            <a:r>
+              <a:rPr lang="en-US" sz="2400" dirty="0"/>
+              <a:t> de </a:t>
+            </a:r>
+            <a:r>
+              <a:rPr lang="en-US" sz="2400" dirty="0" err="1"/>
+              <a:t>integração</a:t>
+            </a:r>
+            <a:r>
+              <a:rPr lang="en-US" sz="2400" dirty="0"/>
+              <a:t> da </a:t>
+            </a:r>
+            <a:r>
+              <a:rPr lang="en-US" sz="2400" dirty="0" err="1"/>
+              <a:t>tecnologia</a:t>
+            </a:r>
+            <a:r>
+              <a:rPr lang="en-US" sz="2400" dirty="0"/>
+              <a:t> com </a:t>
+            </a:r>
+            <a:r>
+              <a:rPr lang="en-US" sz="2400" dirty="0" err="1"/>
+              <a:t>qualquer</a:t>
+            </a:r>
+            <a:r>
+              <a:rPr lang="en-US" sz="2400" dirty="0"/>
+              <a:t> base de dados.</a:t>
+            </a:r>
+          </a:p>
+          <a:p>
+            <a:r>
+              <a:rPr lang="en-US" sz="2400" dirty="0"/>
+              <a:t>	</a:t>
+            </a:r>
+            <a:r>
+              <a:rPr lang="en-US" sz="2400" dirty="0" err="1"/>
+              <a:t>É</a:t>
+            </a:r>
+            <a:r>
+              <a:rPr lang="en-US" sz="2400" dirty="0"/>
+              <a:t> </a:t>
+            </a:r>
+            <a:r>
+              <a:rPr lang="en-US" sz="2400" dirty="0" err="1"/>
+              <a:t>uma</a:t>
+            </a:r>
+            <a:r>
+              <a:rPr lang="en-US" sz="2400" dirty="0"/>
+              <a:t> </a:t>
+            </a:r>
+            <a:r>
+              <a:rPr lang="en-US" sz="2400" dirty="0" err="1"/>
+              <a:t>ferramenta</a:t>
+            </a:r>
+            <a:r>
+              <a:rPr lang="en-US" sz="2400" dirty="0"/>
+              <a:t> </a:t>
+            </a:r>
+            <a:r>
+              <a:rPr lang="en-US" sz="2400" dirty="0" err="1"/>
+              <a:t>desenvolvida</a:t>
+            </a:r>
+            <a:r>
+              <a:rPr lang="en-US" sz="2400" dirty="0"/>
+              <a:t> para </a:t>
+            </a:r>
+            <a:r>
+              <a:rPr lang="en-US" sz="2400" dirty="0" err="1"/>
+              <a:t>profissionais</a:t>
+            </a:r>
+            <a:r>
+              <a:rPr lang="en-US" sz="2400" dirty="0"/>
+              <a:t> da </a:t>
+            </a:r>
+            <a:r>
+              <a:rPr lang="en-US" sz="2400" dirty="0" err="1"/>
+              <a:t>área</a:t>
+            </a:r>
+            <a:r>
+              <a:rPr lang="en-US" sz="2400" dirty="0"/>
+              <a:t> de </a:t>
+            </a:r>
+            <a:r>
+              <a:rPr lang="en-US" sz="2400" dirty="0" err="1"/>
+              <a:t>programação</a:t>
+            </a:r>
+            <a:r>
+              <a:rPr lang="en-US" sz="2400" dirty="0"/>
+              <a:t>, </a:t>
+            </a:r>
+            <a:r>
+              <a:rPr lang="en-US" sz="2400" dirty="0" err="1"/>
+              <a:t>que</a:t>
+            </a:r>
+            <a:r>
+              <a:rPr lang="en-US" sz="2400" dirty="0"/>
+              <a:t> </a:t>
+            </a:r>
+            <a:r>
+              <a:rPr lang="en-US" sz="2400" dirty="0" err="1"/>
+              <a:t>atuem</a:t>
+            </a:r>
+            <a:r>
+              <a:rPr lang="en-US" sz="2400" dirty="0"/>
+              <a:t> com </a:t>
+            </a:r>
+            <a:r>
+              <a:rPr lang="en-US" sz="2400" dirty="0" err="1"/>
+              <a:t>unicamente</a:t>
+            </a:r>
+            <a:r>
+              <a:rPr lang="en-US" sz="2400" dirty="0"/>
+              <a:t> com </a:t>
+            </a:r>
+            <a:r>
+              <a:rPr lang="en-US" sz="2400" dirty="0" err="1"/>
+              <a:t>desenvolvimento</a:t>
+            </a:r>
+            <a:r>
+              <a:rPr lang="en-US" sz="2400" dirty="0"/>
+              <a:t> de </a:t>
+            </a:r>
+            <a:r>
+              <a:rPr lang="en-US" sz="2400" dirty="0" err="1"/>
+              <a:t>aplicações</a:t>
+            </a:r>
+            <a:r>
+              <a:rPr lang="en-US" sz="2400" dirty="0"/>
+              <a:t> da </a:t>
+            </a:r>
+            <a:r>
+              <a:rPr lang="en-US" sz="2400" dirty="0" err="1"/>
+              <a:t>tecnologia</a:t>
+            </a:r>
+            <a:r>
+              <a:rPr lang="en-US" sz="2400" dirty="0"/>
+              <a:t> Java.</a:t>
+            </a:r>
+          </a:p>
+          <a:p>
+            <a:r>
+              <a:rPr lang="en-US" sz="2400" dirty="0"/>
+              <a:t>	</a:t>
+            </a:r>
+            <a:r>
+              <a:rPr lang="en-US" sz="2400" dirty="0" err="1"/>
+              <a:t>Nomeado</a:t>
+            </a:r>
+            <a:r>
+              <a:rPr lang="en-US" sz="2400" dirty="0"/>
+              <a:t> de </a:t>
+            </a:r>
+            <a:r>
+              <a:rPr lang="en-US" sz="2400" dirty="0" err="1"/>
+              <a:t>SigmaDB</a:t>
+            </a:r>
+            <a:r>
+              <a:rPr lang="en-US" sz="2400" dirty="0"/>
+              <a:t>, </a:t>
+            </a:r>
+            <a:r>
+              <a:rPr lang="en-US" sz="2400" dirty="0" err="1"/>
+              <a:t>este</a:t>
+            </a:r>
+            <a:r>
+              <a:rPr lang="en-US" sz="2400" dirty="0"/>
+              <a:t> framework </a:t>
+            </a:r>
+            <a:r>
+              <a:rPr lang="en-US" sz="2400" dirty="0" err="1"/>
+              <a:t>objetiva</a:t>
+            </a:r>
+            <a:r>
+              <a:rPr lang="en-US" sz="2400" dirty="0"/>
+              <a:t> </a:t>
+            </a:r>
+            <a:r>
+              <a:rPr lang="en-US" sz="2400" dirty="0" err="1"/>
+              <a:t>ser</a:t>
+            </a:r>
+            <a:r>
+              <a:rPr lang="en-US" sz="2400" dirty="0"/>
+              <a:t> </a:t>
+            </a:r>
+            <a:r>
+              <a:rPr lang="en-US" sz="2400" dirty="0" err="1"/>
+              <a:t>uma</a:t>
+            </a:r>
+            <a:r>
+              <a:rPr lang="en-US" sz="2400" dirty="0"/>
+              <a:t> </a:t>
+            </a:r>
+            <a:r>
+              <a:rPr lang="en-US" sz="2400" dirty="0" err="1"/>
+              <a:t>ponte</a:t>
+            </a:r>
+            <a:r>
+              <a:rPr lang="en-US" sz="2400" dirty="0"/>
+              <a:t> </a:t>
+            </a:r>
+            <a:r>
+              <a:rPr lang="en-US" sz="2400" dirty="0" err="1"/>
+              <a:t>única</a:t>
+            </a:r>
+            <a:r>
+              <a:rPr lang="en-US" sz="2400" dirty="0"/>
+              <a:t> de </a:t>
+            </a:r>
+            <a:r>
+              <a:rPr lang="en-US" sz="2400" dirty="0" err="1"/>
+              <a:t>acesso</a:t>
+            </a:r>
+            <a:r>
+              <a:rPr lang="en-US" sz="2400" dirty="0"/>
+              <a:t> entre a </a:t>
+            </a:r>
+            <a:r>
+              <a:rPr lang="en-US" sz="2400" dirty="0" err="1"/>
+              <a:t>tecnologia</a:t>
+            </a:r>
+            <a:r>
+              <a:rPr lang="en-US" sz="2400" dirty="0"/>
+              <a:t> Java e </a:t>
+            </a:r>
+            <a:r>
+              <a:rPr lang="en-US" sz="2400" dirty="0" err="1"/>
+              <a:t>qualquer</a:t>
+            </a:r>
+            <a:r>
+              <a:rPr lang="en-US" sz="2400" dirty="0"/>
+              <a:t> Sistema </a:t>
+            </a:r>
+            <a:r>
+              <a:rPr lang="en-US" sz="2400" dirty="0" err="1"/>
+              <a:t>gerenciador</a:t>
+            </a:r>
+            <a:r>
+              <a:rPr lang="en-US" sz="2400" dirty="0"/>
+              <a:t> de banco de dados </a:t>
+            </a:r>
+            <a:r>
+              <a:rPr lang="en-US" sz="2400" dirty="0" err="1"/>
+              <a:t>relacional</a:t>
+            </a:r>
+            <a:r>
+              <a:rPr lang="en-US" sz="2400" dirty="0"/>
+              <a:t>. </a:t>
+            </a:r>
+            <a:r>
+              <a:rPr lang="en-US" sz="2400" dirty="0" err="1"/>
+              <a:t>Convertendo</a:t>
+            </a:r>
+            <a:r>
+              <a:rPr lang="en-US" sz="2400" dirty="0"/>
+              <a:t> o </a:t>
+            </a:r>
+            <a:r>
+              <a:rPr lang="en-US" sz="2400" dirty="0" err="1"/>
+              <a:t>paradigma</a:t>
+            </a:r>
+            <a:r>
+              <a:rPr lang="en-US" sz="2400" dirty="0"/>
+              <a:t> de </a:t>
+            </a:r>
+            <a:r>
+              <a:rPr lang="en-US" sz="2400" dirty="0" err="1"/>
+              <a:t>Orientação</a:t>
+            </a:r>
+            <a:r>
+              <a:rPr lang="en-US" sz="2400" dirty="0"/>
+              <a:t> a </a:t>
+            </a:r>
+            <a:r>
+              <a:rPr lang="en-US" sz="2400" dirty="0" err="1"/>
+              <a:t>objeto</a:t>
+            </a:r>
+            <a:r>
+              <a:rPr lang="en-US" sz="2400" dirty="0"/>
+              <a:t> </a:t>
+            </a:r>
+            <a:r>
+              <a:rPr lang="en-US" sz="2400" dirty="0" err="1"/>
+              <a:t>em</a:t>
+            </a:r>
+            <a:r>
+              <a:rPr lang="en-US" sz="2400" dirty="0"/>
+              <a:t> </a:t>
+            </a:r>
+            <a:r>
+              <a:rPr lang="en-US" sz="2400" dirty="0" err="1"/>
+              <a:t>sintáxes</a:t>
+            </a:r>
+            <a:r>
+              <a:rPr lang="en-US" sz="2400" dirty="0"/>
+              <a:t> SQL de forma </a:t>
+            </a:r>
+            <a:r>
+              <a:rPr lang="en-US" sz="2400" dirty="0" err="1"/>
+              <a:t>automática</a:t>
+            </a:r>
+            <a:r>
+              <a:rPr lang="en-US" sz="2400" dirty="0"/>
+              <a:t>, </a:t>
+            </a:r>
+            <a:r>
+              <a:rPr lang="en-US" sz="2400" dirty="0" err="1"/>
+              <a:t>dentre</a:t>
+            </a:r>
+            <a:r>
+              <a:rPr lang="en-US" sz="2400" dirty="0"/>
+              <a:t> </a:t>
+            </a:r>
+            <a:r>
+              <a:rPr lang="en-US" sz="2400" dirty="0" err="1"/>
+              <a:t>suas</a:t>
+            </a:r>
+            <a:r>
+              <a:rPr lang="en-US" sz="2400" dirty="0"/>
+              <a:t> </a:t>
+            </a:r>
+            <a:r>
+              <a:rPr lang="en-US" sz="2400" dirty="0" err="1"/>
+              <a:t>principais</a:t>
+            </a:r>
+            <a:r>
+              <a:rPr lang="en-US" sz="2400" dirty="0"/>
+              <a:t> </a:t>
+            </a:r>
+            <a:r>
+              <a:rPr lang="en-US" sz="2400" dirty="0" err="1"/>
+              <a:t>metas</a:t>
+            </a:r>
+            <a:r>
+              <a:rPr lang="en-US" sz="2400" dirty="0"/>
+              <a:t> a se </a:t>
+            </a:r>
+            <a:r>
+              <a:rPr lang="en-US" sz="2400" dirty="0" err="1"/>
+              <a:t>atingir</a:t>
+            </a:r>
+            <a:r>
+              <a:rPr lang="en-US" sz="2400" dirty="0"/>
+              <a:t>, </a:t>
+            </a:r>
+            <a:r>
+              <a:rPr lang="en-US" sz="2400" dirty="0" err="1"/>
+              <a:t>pode</a:t>
+            </a:r>
+            <a:r>
+              <a:rPr lang="en-US" sz="2400" dirty="0"/>
+              <a:t>-se </a:t>
+            </a:r>
+            <a:r>
+              <a:rPr lang="en-US" sz="2400" dirty="0" err="1"/>
+              <a:t>dar</a:t>
+            </a:r>
+            <a:r>
+              <a:rPr lang="en-US" sz="2400" dirty="0"/>
+              <a:t> </a:t>
+            </a:r>
+            <a:r>
+              <a:rPr lang="en-US" sz="2400" dirty="0" err="1"/>
+              <a:t>ênfase</a:t>
+            </a:r>
+            <a:r>
+              <a:rPr lang="en-US" sz="2400" dirty="0"/>
+              <a:t> </a:t>
+            </a:r>
+            <a:r>
+              <a:rPr lang="en-US" sz="2400" dirty="0" err="1"/>
+              <a:t>na</a:t>
+            </a:r>
+            <a:r>
+              <a:rPr lang="en-US" sz="2400" dirty="0"/>
+              <a:t> </a:t>
+            </a:r>
+            <a:r>
+              <a:rPr lang="en-US" sz="2400" dirty="0" err="1"/>
+              <a:t>agilidade</a:t>
+            </a:r>
+            <a:r>
+              <a:rPr lang="en-US" sz="2400" dirty="0"/>
+              <a:t> de </a:t>
+            </a:r>
+            <a:r>
+              <a:rPr lang="en-US" sz="2400" dirty="0" err="1"/>
+              <a:t>integração</a:t>
+            </a:r>
+            <a:r>
+              <a:rPr lang="en-US" sz="2400" dirty="0"/>
+              <a:t> e </a:t>
+            </a:r>
+            <a:r>
+              <a:rPr lang="en-US" sz="2400" dirty="0" err="1"/>
+              <a:t>desenvolvimento</a:t>
+            </a:r>
+            <a:r>
+              <a:rPr lang="en-US" sz="2400" dirty="0"/>
+              <a:t> de </a:t>
+            </a:r>
+            <a:r>
+              <a:rPr lang="en-US" sz="2400" dirty="0" err="1"/>
+              <a:t>códigos</a:t>
+            </a:r>
+            <a:r>
+              <a:rPr lang="en-US" sz="2400" dirty="0"/>
+              <a:t>, </a:t>
+            </a:r>
+            <a:r>
+              <a:rPr lang="en-US" sz="2400" dirty="0" err="1"/>
+              <a:t>construção</a:t>
+            </a:r>
+            <a:r>
+              <a:rPr lang="en-US" sz="2400" dirty="0"/>
+              <a:t> de </a:t>
+            </a:r>
+            <a:r>
+              <a:rPr lang="en-US" sz="2400" dirty="0" err="1"/>
+              <a:t>códigos</a:t>
+            </a:r>
+            <a:r>
+              <a:rPr lang="en-US" sz="2400" dirty="0"/>
+              <a:t> </a:t>
+            </a:r>
+            <a:r>
+              <a:rPr lang="en-US" sz="2400" dirty="0" err="1"/>
+              <a:t>coesos</a:t>
+            </a:r>
+            <a:r>
+              <a:rPr lang="en-US" sz="2400" dirty="0"/>
+              <a:t> e </a:t>
+            </a:r>
+            <a:r>
+              <a:rPr lang="en-US" sz="2400" dirty="0" err="1"/>
+              <a:t>bem</a:t>
+            </a:r>
+            <a:r>
+              <a:rPr lang="en-US" sz="2400" dirty="0"/>
+              <a:t> </a:t>
+            </a:r>
+            <a:r>
+              <a:rPr lang="en-US" sz="2400" dirty="0" err="1"/>
+              <a:t>estruturados</a:t>
+            </a:r>
+            <a:r>
+              <a:rPr lang="en-US" sz="2400" dirty="0"/>
+              <a:t>.</a:t>
+            </a:r>
+          </a:p>
+          <a:p>
+            <a:r>
+              <a:rPr lang="en-US" sz="2400" dirty="0"/>
+              <a:t>	</a:t>
+            </a:r>
+          </a:p>
+        </p:txBody>
+      </p:sp>
+    </p:spTree>
+    <p:extLst>
+      <p:ext uri="{BB962C8B-B14F-4D97-AF65-F5344CB8AC3E}">
+        <p14:creationId xmlns:p14="http://schemas.microsoft.com/office/powerpoint/2010/main" val="2126626186"/>
+      </p:ext>
+    </p:extLst>
+  </p:cSld>
+  <p:clrMapOvr>
+    <a:masterClrMapping/>
+  </p:clrMapOvr>
+  <p:timing>
+    <p:tnLst>
+      <p:par>
+        <p:cTn id="1" dur="indefinite" restart="never" nodeType="tmRoot"/>
+      </p:par>
+    </p:tnLst>
+  </p:timing>
+</p:sld>
+</file>
+
+<file path=ppt/slides/slide5.xml><?xml version="1.0" encoding="utf-8"?>
 <p:sld xmlns:a="http://schemas.openxmlformats.org/drawingml/2006/main" xmlns:r="http://schemas.openxmlformats.org/officeDocument/2006/relationships" xmlns:p="http://schemas.openxmlformats.org/presentationml/2006/main">
   <p:cSld>
     <p:spTree>

</xml_diff>